<commit_message>
Resset button and new presentation button added.
</commit_message>
<xml_diff>
--- a/data/generated_presentation_Deutsch.pptx
+++ b/data/generated_presentation_Deutsch.pptx
@@ -3111,7 +3111,7 @@
           <a:lstStyle/>
           <a:p>
             <a:r>
-              <a:t>Halluzinationen in LLMs: Eine Herausforderung</a:t>
+              <a:t>LLM-Halluzinationen: Eine kritische Herausforderung</a:t>
             </a:r>
           </a:p>
         </p:txBody>
@@ -3136,7 +3136,7 @@
               <a:defRPr sz="1800"/>
             </a:pPr>
             <a:r>
-              <a:t>LLMs generieren überzeugend falsche Inhalte.</a:t>
+              <a:t>LLMs: Leistungsstark, doch fehleranfällig.</a:t>
             </a:r>
           </a:p>
           <a:p>
@@ -3144,7 +3144,7 @@
               <a:defRPr sz="1800"/>
             </a:pPr>
             <a:r>
-              <a:t>Hindernis für sicheren Einsatz.</a:t>
+              <a:t>Halluzinationen: Plausible, aber faktisch falsch.</a:t>
             </a:r>
           </a:p>
           <a:p>
@@ -3152,11 +3152,35 @@
               <a:defRPr sz="1800"/>
             </a:pPr>
             <a:r>
-              <a:t>Überblick über Erkennung &amp; Minderung.</a:t>
-            </a:r>
-          </a:p>
-        </p:txBody>
-      </p:sp>
+              <a:t>Konsequenzen: Fehlinformationen, Vertrauensverlust, Schäden.</a:t>
+            </a:r>
+          </a:p>
+        </p:txBody>
+      </p:sp>
+      <p:pic>
+        <p:nvPicPr>
+          <p:cNvPr id="4" name="Picture 3" descr="img_AIerror.jpg"/>
+          <p:cNvPicPr>
+            <a:picLocks noChangeAspect="1"/>
+          </p:cNvPicPr>
+          <p:nvPr/>
+        </p:nvPicPr>
+        <p:blipFill>
+          <a:blip r:embed="rId2"/>
+          <a:stretch>
+            <a:fillRect/>
+          </a:stretch>
+        </p:blipFill>
+        <p:spPr>
+          <a:xfrm>
+            <a:off x="9144000" y="1828800"/>
+            <a:ext cx="5029200" cy="5029200"/>
+          </a:xfrm>
+          <a:prstGeom prst="rect">
+            <a:avLst/>
+          </a:prstGeom>
+        </p:spPr>
+      </p:pic>
     </p:spTree>
   </p:cSld>
   <p:clrMapOvr>
@@ -3191,7 +3215,7 @@
           <a:lstStyle/>
           <a:p>
             <a:r>
-              <a:t>Was sind Halluzinationen?</a:t>
+              <a:t>Ursachen von LLM-Halluzinationen</a:t>
             </a:r>
           </a:p>
         </p:txBody>
@@ -3216,7 +3240,7 @@
               <a:defRPr sz="1800"/>
             </a:pPr>
             <a:r>
-              <a:t>Sachlich falsche, unbegründete Aussagen.</a:t>
+              <a:t>Trainingsdaten: Unvollständig, veraltet, fehlerhaft.</a:t>
             </a:r>
           </a:p>
           <a:p>
@@ -3224,7 +3248,7 @@
               <a:defRPr sz="1800"/>
             </a:pPr>
             <a:r>
-              <a:t>Factual vs. Faithful Hallucinations.</a:t>
+              <a:t>Overfitting: Zu starke Anpassung an Daten.</a:t>
             </a:r>
           </a:p>
           <a:p>
@@ -3232,14 +3256,22 @@
               <a:defRPr sz="1800"/>
             </a:pPr>
             <a:r>
-              <a:t>Beispiele: Satzwidersprüche, erfundene Fakten.</a:t>
+              <a:t>Inferenz: Zufällige Token-Auswahl erzeugt Fehler.</a:t>
+            </a:r>
+          </a:p>
+          <a:p>
+            <a:pPr>
+              <a:defRPr sz="1800"/>
+            </a:pPr>
+            <a:r>
+              <a:t>Architektur: Nicht für Weltwissen optimiert.</a:t>
             </a:r>
           </a:p>
         </p:txBody>
       </p:sp>
       <p:pic>
         <p:nvPicPr>
-          <p:cNvPr id="4" name="Picture 3" descr="img_falsefacts.jpg"/>
+          <p:cNvPr id="4" name="Picture 3" descr="img_databias.jpg"/>
           <p:cNvPicPr>
             <a:picLocks noChangeAspect="1"/>
           </p:cNvPicPr>
@@ -3295,7 +3327,7 @@
           <a:lstStyle/>
           <a:p>
             <a:r>
-              <a:t>Ursachen von Halluzinationen</a:t>
+              <a:t>Halluzinationserkennung: Klassische Ansätze</a:t>
             </a:r>
           </a:p>
         </p:txBody>
@@ -3320,7 +3352,7 @@
               <a:defRPr sz="1800"/>
             </a:pPr>
             <a:r>
-              <a:t>Fehlerhafte Trainingsdaten.</a:t>
+              <a:t>Fact-Checking: Abgleich mit externen Quellen.</a:t>
             </a:r>
           </a:p>
           <a:p>
@@ -3328,7 +3360,7 @@
               <a:defRPr sz="1800"/>
             </a:pPr>
             <a:r>
-              <a:t>Overfitting &amp; Trainingsmethoden.</a:t>
+              <a:t>Unsicherheits-Schätzung: Modell-Konfidenz bewerten.</a:t>
             </a:r>
           </a:p>
           <a:p>
@@ -3336,14 +3368,14 @@
               <a:defRPr sz="1800"/>
             </a:pPr>
             <a:r>
-              <a:t>Inferenzstrategien &amp; Modellarchitektur.</a:t>
+              <a:t>Nachteile: Hoher Aufwand, Quellen-Abhängigkeit, Überkonfidenz.</a:t>
             </a:r>
           </a:p>
         </p:txBody>
       </p:sp>
       <p:pic>
         <p:nvPicPr>
-          <p:cNvPr id="4" name="Picture 3" descr="img_databias.jpg"/>
+          <p:cNvPr id="4" name="Picture 3" descr="img_factcheck.jpg"/>
           <p:cNvPicPr>
             <a:picLocks noChangeAspect="1"/>
           </p:cNvPicPr>
@@ -3399,7 +3431,7 @@
           <a:lstStyle/>
           <a:p>
             <a:r>
-              <a:t>Halluzinationserkennung: Klassische Ansätze</a:t>
+              <a:t>Erkennung durch interne LLM-Schichten</a:t>
             </a:r>
           </a:p>
         </p:txBody>
@@ -3424,7 +3456,7 @@
               <a:defRPr sz="1800"/>
             </a:pPr>
             <a:r>
-              <a:t>Faktencheck: Externe Quellen oder interne Prüfung.</a:t>
+              <a:t>Probing: Analyse interner Modell-Repräsentationen.</a:t>
             </a:r>
           </a:p>
           <a:p>
@@ -3432,7 +3464,7 @@
               <a:defRPr sz="1800"/>
             </a:pPr>
             <a:r>
-              <a:t>Unsicherheitsschätzung: Modellverhalten oder interne Zustände.</a:t>
+              <a:t>Wichtige Infos: Oft in mittleren/späteren Schichten.</a:t>
             </a:r>
           </a:p>
           <a:p>
@@ -3440,14 +3472,22 @@
               <a:defRPr sz="1800"/>
             </a:pPr>
             <a:r>
-              <a:t>Herausforderungen: Kosten, Zuverlässigkeit der Quellen.</a:t>
+              <a:t>Vorteil: Kostengünstig, keine Neuschulung des LLM.</a:t>
+            </a:r>
+          </a:p>
+          <a:p>
+            <a:pPr>
+              <a:defRPr sz="1800"/>
+            </a:pPr>
+            <a:r>
+              <a:t>Herausforderung: Generalisierung über Datensätze.</a:t>
             </a:r>
           </a:p>
         </p:txBody>
       </p:sp>
       <p:pic>
         <p:nvPicPr>
-          <p:cNvPr id="4" name="Picture 3" descr="img_factcheck.jpg"/>
+          <p:cNvPr id="4" name="Picture 3" descr="img_brainscan.jpg"/>
           <p:cNvPicPr>
             <a:picLocks noChangeAspect="1"/>
           </p:cNvPicPr>
@@ -3503,7 +3543,7 @@
           <a:lstStyle/>
           <a:p>
             <a:r>
-              <a:t>Neue Wege: Interne Schichten nutzen</a:t>
+              <a:t>Strategien zur Halluzinationsminderung</a:t>
             </a:r>
           </a:p>
         </p:txBody>
@@ -3528,7 +3568,7 @@
               <a:defRPr sz="1800"/>
             </a:pPr>
             <a:r>
-              <a:t>Probes analysieren interne Repräsentationen.</a:t>
+              <a:t>Zwei Wege: Prompt Engineering, Modellentwicklung.</a:t>
             </a:r>
           </a:p>
           <a:p>
@@ -3536,7 +3576,7 @@
               <a:defRPr sz="1800"/>
             </a:pPr>
             <a:r>
-              <a:t>Erkennung ohne erneutes LLM-Training.</a:t>
+              <a:t>Über 32 Techniken identifiziert.</a:t>
             </a:r>
           </a:p>
           <a:p>
@@ -3544,35 +3584,11 @@
               <a:defRPr sz="1800"/>
             </a:pPr>
             <a:r>
-              <a:t>Fokus auf mittlere bis spätere Schichten.</a:t>
-            </a:r>
-          </a:p>
-        </p:txBody>
-      </p:sp>
-      <p:pic>
-        <p:nvPicPr>
-          <p:cNvPr id="4" name="Picture 3" descr="img_AIinternal.jpg"/>
-          <p:cNvPicPr>
-            <a:picLocks noChangeAspect="1"/>
-          </p:cNvPicPr>
-          <p:nvPr/>
-        </p:nvPicPr>
-        <p:blipFill>
-          <a:blip r:embed="rId2"/>
-          <a:stretch>
-            <a:fillRect/>
-          </a:stretch>
-        </p:blipFill>
-        <p:spPr>
-          <a:xfrm>
-            <a:off x="9144000" y="1828800"/>
-            <a:ext cx="5029200" cy="5029200"/>
-          </a:xfrm>
-          <a:prstGeom prst="rect">
-            <a:avLst/>
-          </a:prstGeom>
-        </p:spPr>
-      </p:pic>
+              <a:t>Ziel: Faktentreue und Verlässlichkeit steigern.</a:t>
+            </a:r>
+          </a:p>
+        </p:txBody>
+      </p:sp>
     </p:spTree>
   </p:cSld>
   <p:clrMapOvr>
@@ -3607,7 +3623,7 @@
           <a:lstStyle/>
           <a:p>
             <a:r>
-              <a:t>Unsere Methode: Schicht-Vergleich</a:t>
+              <a:t>Minderung durch Prompt Engineering</a:t>
             </a:r>
           </a:p>
         </p:txBody>
@@ -3632,7 +3648,7 @@
               <a:defRPr sz="1800"/>
             </a:pPr>
             <a:r>
-              <a:t>Gleicher Feature-Extraktor pro Schicht.</a:t>
+              <a:t>RAG: Externe Wissensbasis integrieren.</a:t>
             </a:r>
           </a:p>
           <a:p>
@@ -3640,7 +3656,7 @@
               <a:defRPr sz="1800"/>
             </a:pPr>
             <a:r>
-              <a:t>Vergleich der Schicht-Ausgaben (z.B. Kosinus-Ähnlichkeit).</a:t>
+              <a:t>Self-Refinement: Iteratives Feedback zur Verbesserung.</a:t>
             </a:r>
           </a:p>
           <a:p>
@@ -3648,14 +3664,14 @@
               <a:defRPr sz="1800"/>
             </a:pPr>
             <a:r>
-              <a:t>Aggregation zur Klassifikation.</a:t>
+              <a:t>Prompt Tuning: Anweisungen für spezifische Aufgaben optimieren.</a:t>
             </a:r>
           </a:p>
         </p:txBody>
       </p:sp>
       <p:pic>
         <p:nvPicPr>
-          <p:cNvPr id="4" name="Picture 3" descr="img_AIarchitecture.jpg"/>
+          <p:cNvPr id="4" name="Picture 3" descr="img_promptengineering.jpg"/>
           <p:cNvPicPr>
             <a:picLocks noChangeAspect="1"/>
           </p:cNvPicPr>
@@ -3711,7 +3727,7 @@
           <a:lstStyle/>
           <a:p>
             <a:r>
-              <a:t>Generalisierung: Eine Kernherausforderung</a:t>
+              <a:t>Minderung durch Modellentwicklung</a:t>
             </a:r>
           </a:p>
         </p:txBody>
@@ -3736,7 +3752,7 @@
               <a:defRPr sz="1800"/>
             </a:pPr>
             <a:r>
-              <a:t>Gute Leistung auf Trainingsdaten.</a:t>
+              <a:t>Decoding-Strategien: Generierungsprozess gezielt steuern.</a:t>
             </a:r>
           </a:p>
           <a:p>
@@ -3744,7 +3760,7 @@
               <a:defRPr sz="1800"/>
             </a:pPr>
             <a:r>
-              <a:t>Schwierige Übertragung auf neue Benchmarks.</a:t>
+              <a:t>Knowledge Graphs: Strukturierte Fakten einbinden.</a:t>
             </a:r>
           </a:p>
           <a:p>
@@ -3752,14 +3768,14 @@
               <a:defRPr sz="1800"/>
             </a:pPr>
             <a:r>
-              <a:t>Modellgröße und Label-Imbalance beeinflussen.</a:t>
+              <a:t>Finetuning: Modelle auf Faktentreue anpassen.</a:t>
             </a:r>
           </a:p>
         </p:txBody>
       </p:sp>
       <p:pic>
         <p:nvPicPr>
-          <p:cNvPr id="4" name="Picture 3" descr="img_AIgeneralization.jpg"/>
+          <p:cNvPr id="4" name="Picture 3" descr="img_AIdevelopment.jpg"/>
           <p:cNvPicPr>
             <a:picLocks noChangeAspect="1"/>
           </p:cNvPicPr>
@@ -3815,7 +3831,7 @@
           <a:lstStyle/>
           <a:p>
             <a:r>
-              <a:t>Minderung &amp; Zukunftsperspektiven</a:t>
+              <a:t>Halluzinationsminderung: Grenzen und Zukunft</a:t>
             </a:r>
           </a:p>
         </p:txBody>
@@ -3840,7 +3856,7 @@
               <a:defRPr sz="1800"/>
             </a:pPr>
             <a:r>
-              <a:t>RAG, Selbst-Verfeinerung, Prompt Tuning.</a:t>
+              <a:t>Generalisierung: Transfer auf neue Daten schwierig.</a:t>
             </a:r>
           </a:p>
           <a:p>
@@ -3848,7 +3864,7 @@
               <a:defRPr sz="1800"/>
             </a:pPr>
             <a:r>
-              <a:t>Neue Dekodierungsstrategien, Knowledge Graphs.</a:t>
+              <a:t>Fein-granulare Erkennung: Hohe Komplexität.</a:t>
             </a:r>
           </a:p>
           <a:p>
@@ -3856,14 +3872,22 @@
               <a:defRPr sz="1800"/>
             </a:pPr>
             <a:r>
-              <a:t>Hybridmodelle, ethische Implikationen.</a:t>
+              <a:t>Hybridmodelle: Kombination verschiedener Ansätze.</a:t>
+            </a:r>
+          </a:p>
+          <a:p>
+            <a:pPr>
+              <a:defRPr sz="1800"/>
+            </a:pPr>
+            <a:r>
+              <a:t>Forschung: Ethik, Skalierbarkeit, neue Architekturen.</a:t>
             </a:r>
           </a:p>
         </p:txBody>
       </p:sp>
       <p:pic>
         <p:nvPicPr>
-          <p:cNvPr id="4" name="Picture 3" descr="img_AIfuture.jpg"/>
+          <p:cNvPr id="4" name="Picture 3" descr="img_futuretechnology.jpg"/>
           <p:cNvPicPr>
             <a:picLocks noChangeAspect="1"/>
           </p:cNvPicPr>

</xml_diff>

<commit_message>
Letzte Version vor dem Template intergraton.
</commit_message>
<xml_diff>
--- a/data/generated_presentation_Deutsch.pptx
+++ b/data/generated_presentation_Deutsch.pptx
@@ -3111,7 +3111,7 @@
           <a:lstStyle/>
           <a:p>
             <a:r>
-              <a:t>LLM-Halluzinationen: Eine kritische Herausforderung</a:t>
+              <a:t>Halluzinationen in generativer KI</a:t>
             </a:r>
           </a:p>
         </p:txBody>
@@ -3136,7 +3136,7 @@
               <a:defRPr sz="1800"/>
             </a:pPr>
             <a:r>
-              <a:t>LLMs: Leistungsstark, doch fehleranfällig.</a:t>
+              <a:t>LLMs erzeugen überzeugend falsche Inhalte.</a:t>
             </a:r>
           </a:p>
           <a:p>
@@ -3144,7 +3144,7 @@
               <a:defRPr sz="1800"/>
             </a:pPr>
             <a:r>
-              <a:t>Halluzinationen: Plausible, aber faktisch falsch.</a:t>
+              <a:t>Große Herausforderung für den Einsatz.</a:t>
             </a:r>
           </a:p>
           <a:p>
@@ -3152,35 +3152,11 @@
               <a:defRPr sz="1800"/>
             </a:pPr>
             <a:r>
-              <a:t>Konsequenzen: Fehlinformationen, Vertrauensverlust, Schäden.</a:t>
-            </a:r>
-          </a:p>
-        </p:txBody>
-      </p:sp>
-      <p:pic>
-        <p:nvPicPr>
-          <p:cNvPr id="4" name="Picture 3" descr="img_AIerror.jpg"/>
-          <p:cNvPicPr>
-            <a:picLocks noChangeAspect="1"/>
-          </p:cNvPicPr>
-          <p:nvPr/>
-        </p:nvPicPr>
-        <p:blipFill>
-          <a:blip r:embed="rId2"/>
-          <a:stretch>
-            <a:fillRect/>
-          </a:stretch>
-        </p:blipFill>
-        <p:spPr>
-          <a:xfrm>
-            <a:off x="9144000" y="1828800"/>
-            <a:ext cx="5029200" cy="5029200"/>
-          </a:xfrm>
-          <a:prstGeom prst="rect">
-            <a:avLst/>
-          </a:prstGeom>
-        </p:spPr>
-      </p:pic>
+              <a:t>Erkennung und Minderung sind entscheidend.</a:t>
+            </a:r>
+          </a:p>
+        </p:txBody>
+      </p:sp>
     </p:spTree>
   </p:cSld>
   <p:clrMapOvr>
@@ -3215,7 +3191,7 @@
           <a:lstStyle/>
           <a:p>
             <a:r>
-              <a:t>Ursachen von LLM-Halluzinationen</a:t>
+              <a:t>Was sind Halluzinationen?</a:t>
             </a:r>
           </a:p>
         </p:txBody>
@@ -3240,7 +3216,7 @@
               <a:defRPr sz="1800"/>
             </a:pPr>
             <a:r>
-              <a:t>Trainingsdaten: Unvollständig, veraltet, fehlerhaft.</a:t>
+              <a:t>Sprachlich überzeugend, sachlich falsch.</a:t>
             </a:r>
           </a:p>
           <a:p>
@@ -3248,7 +3224,7 @@
               <a:defRPr sz="1800"/>
             </a:pPr>
             <a:r>
-              <a:t>Overfitting: Zu starke Anpassung an Daten.</a:t>
+              <a:t>Von kleinen Fehlern bis Erfindungen.</a:t>
             </a:r>
           </a:p>
           <a:p>
@@ -3256,43 +3232,11 @@
               <a:defRPr sz="1800"/>
             </a:pPr>
             <a:r>
-              <a:t>Inferenz: Zufällige Token-Auswahl erzeugt Fehler.</a:t>
-            </a:r>
-          </a:p>
-          <a:p>
-            <a:pPr>
-              <a:defRPr sz="1800"/>
-            </a:pPr>
-            <a:r>
-              <a:t>Architektur: Nicht für Weltwissen optimiert.</a:t>
-            </a:r>
-          </a:p>
-        </p:txBody>
-      </p:sp>
-      <p:pic>
-        <p:nvPicPr>
-          <p:cNvPr id="4" name="Picture 3" descr="img_databias.jpg"/>
-          <p:cNvPicPr>
-            <a:picLocks noChangeAspect="1"/>
-          </p:cNvPicPr>
-          <p:nvPr/>
-        </p:nvPicPr>
-        <p:blipFill>
-          <a:blip r:embed="rId2"/>
-          <a:stretch>
-            <a:fillRect/>
-          </a:stretch>
-        </p:blipFill>
-        <p:spPr>
-          <a:xfrm>
-            <a:off x="9144000" y="1828800"/>
-            <a:ext cx="5029200" cy="5029200"/>
-          </a:xfrm>
-          <a:prstGeom prst="rect">
-            <a:avLst/>
-          </a:prstGeom>
-        </p:spPr>
-      </p:pic>
+              <a:t>Beispiel: „Mondscheinformel“ existiert nicht.</a:t>
+            </a:r>
+          </a:p>
+        </p:txBody>
+      </p:sp>
     </p:spTree>
   </p:cSld>
   <p:clrMapOvr>
@@ -3327,7 +3271,7 @@
           <a:lstStyle/>
           <a:p>
             <a:r>
-              <a:t>Halluzinationserkennung: Klassische Ansätze</a:t>
+              <a:t>Typen von Halluzinationen</a:t>
             </a:r>
           </a:p>
         </p:txBody>
@@ -3352,7 +3296,7 @@
               <a:defRPr sz="1800"/>
             </a:pPr>
             <a:r>
-              <a:t>Fact-Checking: Abgleich mit externen Quellen.</a:t>
+              <a:t>Satz- und Prompt-Widersprüche.</a:t>
             </a:r>
           </a:p>
           <a:p>
@@ -3360,7 +3304,7 @@
               <a:defRPr sz="1800"/>
             </a:pPr>
             <a:r>
-              <a:t>Unsicherheits-Schätzung: Modell-Konfidenz bewerten.</a:t>
+              <a:t>Faktische Fehler, erfundene Inhalte.</a:t>
             </a:r>
           </a:p>
           <a:p>
@@ -3368,35 +3312,11 @@
               <a:defRPr sz="1800"/>
             </a:pPr>
             <a:r>
-              <a:t>Nachteile: Hoher Aufwand, Quellen-Abhängigkeit, Überkonfidenz.</a:t>
-            </a:r>
-          </a:p>
-        </p:txBody>
-      </p:sp>
-      <p:pic>
-        <p:nvPicPr>
-          <p:cNvPr id="4" name="Picture 3" descr="img_factcheck.jpg"/>
-          <p:cNvPicPr>
-            <a:picLocks noChangeAspect="1"/>
-          </p:cNvPicPr>
-          <p:nvPr/>
-        </p:nvPicPr>
-        <p:blipFill>
-          <a:blip r:embed="rId2"/>
-          <a:stretch>
-            <a:fillRect/>
-          </a:stretch>
-        </p:blipFill>
-        <p:spPr>
-          <a:xfrm>
-            <a:off x="9144000" y="1828800"/>
-            <a:ext cx="5029200" cy="5029200"/>
-          </a:xfrm>
-          <a:prstGeom prst="rect">
-            <a:avLst/>
-          </a:prstGeom>
-        </p:spPr>
-      </p:pic>
+              <a:t>Sinnfreie oder absurde Ausgaben.</a:t>
+            </a:r>
+          </a:p>
+        </p:txBody>
+      </p:sp>
     </p:spTree>
   </p:cSld>
   <p:clrMapOvr>
@@ -3431,7 +3351,7 @@
           <a:lstStyle/>
           <a:p>
             <a:r>
-              <a:t>Erkennung durch interne LLM-Schichten</a:t>
+              <a:t>Ursachen von Halluzinationen</a:t>
             </a:r>
           </a:p>
         </p:txBody>
@@ -3456,7 +3376,7 @@
               <a:defRPr sz="1800"/>
             </a:pPr>
             <a:r>
-              <a:t>Probing: Analyse interner Modell-Repräsentationen.</a:t>
+              <a:t>Fehlerhafte Trainingsdaten, Overfitting.</a:t>
             </a:r>
           </a:p>
           <a:p>
@@ -3464,7 +3384,7 @@
               <a:defRPr sz="1800"/>
             </a:pPr>
             <a:r>
-              <a:t>Wichtige Infos: Oft in mittleren/späteren Schichten.</a:t>
+              <a:t>Trainingsmethoden, zufällige Dekodierung.</a:t>
             </a:r>
           </a:p>
           <a:p>
@@ -3472,43 +3392,11 @@
               <a:defRPr sz="1800"/>
             </a:pPr>
             <a:r>
-              <a:t>Vorteil: Kostengünstig, keine Neuschulung des LLM.</a:t>
-            </a:r>
-          </a:p>
-          <a:p>
-            <a:pPr>
-              <a:defRPr sz="1800"/>
-            </a:pPr>
-            <a:r>
-              <a:t>Herausforderung: Generalisierung über Datensätze.</a:t>
-            </a:r>
-          </a:p>
-        </p:txBody>
-      </p:sp>
-      <p:pic>
-        <p:nvPicPr>
-          <p:cNvPr id="4" name="Picture 3" descr="img_brainscan.jpg"/>
-          <p:cNvPicPr>
-            <a:picLocks noChangeAspect="1"/>
-          </p:cNvPicPr>
-          <p:nvPr/>
-        </p:nvPicPr>
-        <p:blipFill>
-          <a:blip r:embed="rId2"/>
-          <a:stretch>
-            <a:fillRect/>
-          </a:stretch>
-        </p:blipFill>
-        <p:spPr>
-          <a:xfrm>
-            <a:off x="9144000" y="1828800"/>
-            <a:ext cx="5029200" cy="5029200"/>
-          </a:xfrm>
-          <a:prstGeom prst="rect">
-            <a:avLst/>
-          </a:prstGeom>
-        </p:spPr>
-      </p:pic>
+              <a:t>Ungeeignete Modellarchitektur.</a:t>
+            </a:r>
+          </a:p>
+        </p:txBody>
+      </p:sp>
     </p:spTree>
   </p:cSld>
   <p:clrMapOvr>
@@ -3543,7 +3431,7 @@
           <a:lstStyle/>
           <a:p>
             <a:r>
-              <a:t>Strategien zur Halluzinationsminderung</a:t>
+              <a:t>Erkennung: Traditionelle Methoden</a:t>
             </a:r>
           </a:p>
         </p:txBody>
@@ -3568,7 +3456,7 @@
               <a:defRPr sz="1800"/>
             </a:pPr>
             <a:r>
-              <a:t>Zwei Wege: Prompt Engineering, Modellentwicklung.</a:t>
+              <a:t>Faktencheck: Externe Quellen, interne Prüfung.</a:t>
             </a:r>
           </a:p>
           <a:p>
@@ -3576,7 +3464,7 @@
               <a:defRPr sz="1800"/>
             </a:pPr>
             <a:r>
-              <a:t>Über 32 Techniken identifiziert.</a:t>
+              <a:t>Unsicherheitsschätzung: Interne Zustände, Verhalten.</a:t>
             </a:r>
           </a:p>
           <a:p>
@@ -3584,7 +3472,7 @@
               <a:defRPr sz="1800"/>
             </a:pPr>
             <a:r>
-              <a:t>Ziel: Faktentreue und Verlässlichkeit steigern.</a:t>
+              <a:t>Nachteile: Rechenaufwand, unzuverlässige Quellen.</a:t>
             </a:r>
           </a:p>
         </p:txBody>
@@ -3623,7 +3511,7 @@
           <a:lstStyle/>
           <a:p>
             <a:r>
-              <a:t>Minderung durch Prompt Engineering</a:t>
+              <a:t>Erkennung: Interne LLM-Schichten</a:t>
             </a:r>
           </a:p>
         </p:txBody>
@@ -3648,7 +3536,7 @@
               <a:defRPr sz="1800"/>
             </a:pPr>
             <a:r>
-              <a:t>RAG: Externe Wissensbasis integrieren.</a:t>
+              <a:t>Neue Ansätze nutzen interne Repräsentationen.</a:t>
             </a:r>
           </a:p>
           <a:p>
@@ -3656,7 +3544,7 @@
               <a:defRPr sz="1800"/>
             </a:pPr>
             <a:r>
-              <a:t>Self-Refinement: Iteratives Feedback zur Verbesserung.</a:t>
+              <a:t>„Probes“ klassifizieren Halluzinationen direkt.</a:t>
             </a:r>
           </a:p>
           <a:p>
@@ -3664,35 +3552,11 @@
               <a:defRPr sz="1800"/>
             </a:pPr>
             <a:r>
-              <a:t>Prompt Tuning: Anweisungen für spezifische Aufgaben optimieren.</a:t>
-            </a:r>
-          </a:p>
-        </p:txBody>
-      </p:sp>
-      <p:pic>
-        <p:nvPicPr>
-          <p:cNvPr id="4" name="Picture 3" descr="img_promptengineering.jpg"/>
-          <p:cNvPicPr>
-            <a:picLocks noChangeAspect="1"/>
-          </p:cNvPicPr>
-          <p:nvPr/>
-        </p:nvPicPr>
-        <p:blipFill>
-          <a:blip r:embed="rId2"/>
-          <a:stretch>
-            <a:fillRect/>
-          </a:stretch>
-        </p:blipFill>
-        <p:spPr>
-          <a:xfrm>
-            <a:off x="9144000" y="1828800"/>
-            <a:ext cx="5029200" cy="5029200"/>
-          </a:xfrm>
-          <a:prstGeom prst="rect">
-            <a:avLst/>
-          </a:prstGeom>
-        </p:spPr>
-      </p:pic>
+              <a:t>Vorteil: Keine Neuschulung des LLM.</a:t>
+            </a:r>
+          </a:p>
+        </p:txBody>
+      </p:sp>
     </p:spTree>
   </p:cSld>
   <p:clrMapOvr>
@@ -3727,7 +3591,7 @@
           <a:lstStyle/>
           <a:p>
             <a:r>
-              <a:t>Minderung durch Modellentwicklung</a:t>
+              <a:t>Herausforderungen &amp; neue Ansätze</a:t>
             </a:r>
           </a:p>
         </p:txBody>
@@ -3752,7 +3616,7 @@
               <a:defRPr sz="1800"/>
             </a:pPr>
             <a:r>
-              <a:t>Decoding-Strategien: Generierungsprozess gezielt steuern.</a:t>
+              <a:t>Generalisierung über Benchmarks/LLMs schwierig.</a:t>
             </a:r>
           </a:p>
           <a:p>
@@ -3760,7 +3624,7 @@
               <a:defRPr sz="1800"/>
             </a:pPr>
             <a:r>
-              <a:t>Knowledge Graphs: Strukturierte Fakten einbinden.</a:t>
+              <a:t>Dynamische Gewichtung interner Schichten.</a:t>
             </a:r>
           </a:p>
           <a:p>
@@ -3768,35 +3632,11 @@
               <a:defRPr sz="1800"/>
             </a:pPr>
             <a:r>
-              <a:t>Finetuning: Modelle auf Faktentreue anpassen.</a:t>
-            </a:r>
-          </a:p>
-        </p:txBody>
-      </p:sp>
-      <p:pic>
-        <p:nvPicPr>
-          <p:cNvPr id="4" name="Picture 3" descr="img_AIdevelopment.jpg"/>
-          <p:cNvPicPr>
-            <a:picLocks noChangeAspect="1"/>
-          </p:cNvPicPr>
-          <p:nvPr/>
-        </p:nvPicPr>
-        <p:blipFill>
-          <a:blip r:embed="rId2"/>
-          <a:stretch>
-            <a:fillRect/>
-          </a:stretch>
-        </p:blipFill>
-        <p:spPr>
-          <a:xfrm>
-            <a:off x="9144000" y="1828800"/>
-            <a:ext cx="5029200" cy="5029200"/>
-          </a:xfrm>
-          <a:prstGeom prst="rect">
-            <a:avLst/>
-          </a:prstGeom>
-        </p:spPr>
-      </p:pic>
+              <a:t>Potenzial: Bessere Leistung, Generalisierungsverbesserung.</a:t>
+            </a:r>
+          </a:p>
+        </p:txBody>
+      </p:sp>
     </p:spTree>
   </p:cSld>
   <p:clrMapOvr>
@@ -3831,7 +3671,7 @@
           <a:lstStyle/>
           <a:p>
             <a:r>
-              <a:t>Halluzinationsminderung: Grenzen und Zukunft</a:t>
+              <a:t>Fazit &amp; Ausblick</a:t>
             </a:r>
           </a:p>
         </p:txBody>
@@ -3856,7 +3696,7 @@
               <a:defRPr sz="1800"/>
             </a:pPr>
             <a:r>
-              <a:t>Generalisierung: Transfer auf neue Daten schwierig.</a:t>
+              <a:t>Halluzinationen bleiben zentrale Herausforderung.</a:t>
             </a:r>
           </a:p>
           <a:p>
@@ -3864,7 +3704,7 @@
               <a:defRPr sz="1800"/>
             </a:pPr>
             <a:r>
-              <a:t>Fein-granulare Erkennung: Hohe Komplexität.</a:t>
+              <a:t>Interne Schichten vielversprechend für Erkennung.</a:t>
             </a:r>
           </a:p>
           <a:p>
@@ -3872,43 +3712,11 @@
               <a:defRPr sz="1800"/>
             </a:pPr>
             <a:r>
-              <a:t>Hybridmodelle: Kombination verschiedener Ansätze.</a:t>
-            </a:r>
-          </a:p>
-          <a:p>
-            <a:pPr>
-              <a:defRPr sz="1800"/>
-            </a:pPr>
-            <a:r>
-              <a:t>Forschung: Ethik, Skalierbarkeit, neue Architekturen.</a:t>
-            </a:r>
-          </a:p>
-        </p:txBody>
-      </p:sp>
-      <p:pic>
-        <p:nvPicPr>
-          <p:cNvPr id="4" name="Picture 3" descr="img_futuretechnology.jpg"/>
-          <p:cNvPicPr>
-            <a:picLocks noChangeAspect="1"/>
-          </p:cNvPicPr>
-          <p:nvPr/>
-        </p:nvPicPr>
-        <p:blipFill>
-          <a:blip r:embed="rId2"/>
-          <a:stretch>
-            <a:fillRect/>
-          </a:stretch>
-        </p:blipFill>
-        <p:spPr>
-          <a:xfrm>
-            <a:off x="9144000" y="1828800"/>
-            <a:ext cx="5029200" cy="5029200"/>
-          </a:xfrm>
-          <a:prstGeom prst="rect">
-            <a:avLst/>
-          </a:prstGeom>
-        </p:spPr>
-      </p:pic>
+              <a:t>Zukünftige Forschung: Hybridmodelle, Ethik.</a:t>
+            </a:r>
+          </a:p>
+        </p:txBody>
+      </p:sp>
     </p:spTree>
   </p:cSld>
   <p:clrMapOvr>

</xml_diff>